<commit_message>
chg: added WIP to VIS instructions
</commit_message>
<xml_diff>
--- a/VIS WORKSPACE/VIS Instructions.pptx
+++ b/VIS WORKSPACE/VIS Instructions.pptx
@@ -4086,6 +4086,54 @@
           </a:p>
         </p:txBody>
       </p:sp>
+      <p:sp>
+        <p:nvSpPr>
+          <p:cNvPr id="7" name="TekstSylinder 6"/>
+          <p:cNvSpPr txBox="1"/>
+          <p:nvPr/>
+        </p:nvSpPr>
+        <p:spPr>
+          <a:xfrm rot="19521515">
+            <a:off x="1992637" y="6244288"/>
+            <a:ext cx="2304256" cy="707886"/>
+          </a:xfrm>
+          <a:prstGeom prst="rect">
+            <a:avLst/>
+          </a:prstGeom>
+          <a:solidFill>
+            <a:schemeClr val="bg1">
+              <a:alpha val="50000"/>
+            </a:schemeClr>
+          </a:solidFill>
+          <a:ln>
+            <a:solidFill>
+              <a:srgbClr val="FF0000"/>
+            </a:solidFill>
+          </a:ln>
+        </p:spPr>
+        <p:txBody>
+          <a:bodyPr wrap="square" rtlCol="0" anchor="ctr">
+            <a:spAutoFit/>
+          </a:bodyPr>
+          <a:lstStyle/>
+          <a:p>
+            <a:pPr algn="ctr"/>
+            <a:r>
+              <a:rPr lang="en-US" sz="4000" b="1" dirty="0" smtClean="0">
+                <a:solidFill>
+                  <a:srgbClr val="FF0000"/>
+                </a:solidFill>
+              </a:rPr>
+              <a:t>WIP</a:t>
+            </a:r>
+            <a:endParaRPr lang="en-US" sz="4000" b="1" dirty="0">
+              <a:solidFill>
+                <a:srgbClr val="FF0000"/>
+              </a:solidFill>
+            </a:endParaRPr>
+          </a:p>
+        </p:txBody>
+      </p:sp>
     </p:spTree>
   </p:cSld>
   <p:clrMapOvr>
@@ -4176,11 +4224,7 @@
           <a:p>
             <a:r>
               <a:rPr lang="en-US" dirty="0" smtClean="0"/>
-              <a:t>For </a:t>
-            </a:r>
-            <a:r>
-              <a:rPr lang="en-US" dirty="0" smtClean="0"/>
-              <a:t>information that is uncertain, the circle will be drawn with fill opacity as shown below, and line style set as dash dot.</a:t>
+              <a:t>For information that is uncertain, the circle will be drawn with fill opacity as shown below, and line style set as dash dot.</a:t>
             </a:r>
             <a:endParaRPr lang="en-US" dirty="0"/>
           </a:p>
@@ -4308,11 +4352,7 @@
           <a:p>
             <a:r>
               <a:rPr lang="en-US" dirty="0" smtClean="0"/>
-              <a:t>For </a:t>
-            </a:r>
-            <a:r>
-              <a:rPr lang="en-US" dirty="0" smtClean="0"/>
-              <a:t>information that is confirmed, the circle will be drawn with fill opacity as shown below, and line style set as solid.</a:t>
+              <a:t>For information that is confirmed, the circle will be drawn with fill opacity as shown below, and line style set as solid.</a:t>
             </a:r>
             <a:endParaRPr lang="en-US" dirty="0"/>
           </a:p>
@@ -5319,6 +5359,54 @@
               <a:t>summaries</a:t>
             </a:r>
             <a:endParaRPr lang="nb-NO" dirty="0"/>
+          </a:p>
+        </p:txBody>
+      </p:sp>
+      <p:sp>
+        <p:nvSpPr>
+          <p:cNvPr id="5" name="TekstSylinder 4"/>
+          <p:cNvSpPr txBox="1"/>
+          <p:nvPr/>
+        </p:nvSpPr>
+        <p:spPr>
+          <a:xfrm rot="19521515">
+            <a:off x="2064646" y="4156057"/>
+            <a:ext cx="2304256" cy="707886"/>
+          </a:xfrm>
+          <a:prstGeom prst="rect">
+            <a:avLst/>
+          </a:prstGeom>
+          <a:solidFill>
+            <a:schemeClr val="bg1">
+              <a:alpha val="50000"/>
+            </a:schemeClr>
+          </a:solidFill>
+          <a:ln>
+            <a:solidFill>
+              <a:srgbClr val="FF0000"/>
+            </a:solidFill>
+          </a:ln>
+        </p:spPr>
+        <p:txBody>
+          <a:bodyPr wrap="square" rtlCol="0" anchor="ctr">
+            <a:spAutoFit/>
+          </a:bodyPr>
+          <a:lstStyle/>
+          <a:p>
+            <a:pPr algn="ctr"/>
+            <a:r>
+              <a:rPr lang="en-US" sz="4000" b="1" dirty="0" smtClean="0">
+                <a:solidFill>
+                  <a:srgbClr val="FF0000"/>
+                </a:solidFill>
+              </a:rPr>
+              <a:t>WIP</a:t>
+            </a:r>
+            <a:endParaRPr lang="en-US" sz="4000" b="1" dirty="0">
+              <a:solidFill>
+                <a:srgbClr val="FF0000"/>
+              </a:solidFill>
+            </a:endParaRPr>
           </a:p>
         </p:txBody>
       </p:sp>
@@ -6588,7 +6676,6 @@
               <a:rPr lang="en-US" dirty="0" smtClean="0"/>
               <a:t> files will have necessary information plotted into it.</a:t>
             </a:r>
-            <a:endParaRPr lang="en-US" dirty="0" smtClean="0"/>
           </a:p>
           <a:p>
             <a:endParaRPr lang="en-US" dirty="0"/>
@@ -6694,7 +6781,6 @@
               <a:rPr lang="en-US" dirty="0" smtClean="0"/>
               <a:t>Pilots:</a:t>
             </a:r>
-            <a:endParaRPr lang="en-US" dirty="0" smtClean="0"/>
           </a:p>
           <a:p>
             <a:pPr>
@@ -6766,7 +6852,6 @@
               <a:rPr lang="en-US" dirty="0" smtClean="0"/>
               <a:t>Various intelligence reports from other sources</a:t>
             </a:r>
-            <a:endParaRPr lang="en-US" dirty="0" smtClean="0"/>
           </a:p>
           <a:p>
             <a:endParaRPr lang="en-US" dirty="0"/>

</xml_diff>

<commit_message>
chg: Update to VIS, changed filestructure, updated VIS instructions
</commit_message>
<xml_diff>
--- a/VIS WORKSPACE/VIS Instructions.pptx
+++ b/VIS WORKSPACE/VIS Instructions.pptx
@@ -5,7 +5,7 @@
     <p:sldMasterId id="2147483648" r:id="rId1"/>
   </p:sldMasterIdLst>
   <p:notesMasterIdLst>
-    <p:notesMasterId r:id="rId17"/>
+    <p:notesMasterId r:id="rId16"/>
   </p:notesMasterIdLst>
   <p:sldIdLst>
     <p:sldId id="257" r:id="rId2"/>
@@ -21,8 +21,7 @@
     <p:sldId id="356" r:id="rId12"/>
     <p:sldId id="357" r:id="rId13"/>
     <p:sldId id="360" r:id="rId14"/>
-    <p:sldId id="361" r:id="rId15"/>
-    <p:sldId id="364" r:id="rId16"/>
+    <p:sldId id="364" r:id="rId15"/>
   </p:sldIdLst>
   <p:sldSz cx="5143500" cy="9144000" type="screen16x9"/>
   <p:notesSz cx="6858000" cy="9144000"/>
@@ -207,7 +206,7 @@
             <a:fld id="{40637A30-8EE1-4060-9976-8832FC89EE34}" type="datetimeFigureOut">
               <a:rPr lang="nb-NO" smtClean="0"/>
               <a:pPr/>
-              <a:t>06.05.2020</a:t>
+              <a:t>04.08.2020</a:t>
             </a:fld>
             <a:endParaRPr lang="nb-NO"/>
           </a:p>
@@ -4044,7 +4043,14 @@
                 <a:latin typeface="Arial" pitchFamily="34" charset="0"/>
                 <a:cs typeface="Arial" pitchFamily="34" charset="0"/>
               </a:rPr>
-              <a:t>Published: 2020-05-26</a:t>
+              <a:t>Published: </a:t>
+            </a:r>
+            <a:r>
+              <a:rPr lang="en-US" dirty="0" smtClean="0">
+                <a:latin typeface="Arial" pitchFamily="34" charset="0"/>
+                <a:cs typeface="Arial" pitchFamily="34" charset="0"/>
+              </a:rPr>
+              <a:t>2020-08-04</a:t>
             </a:r>
             <a:endParaRPr lang="en-US" dirty="0">
               <a:latin typeface="Arial" pitchFamily="34" charset="0"/>
@@ -4081,7 +4087,21 @@
                 <a:latin typeface="Arial" pitchFamily="34" charset="0"/>
                 <a:cs typeface="Arial" pitchFamily="34" charset="0"/>
               </a:rPr>
-              <a:t>Version: 0.2 DRAFT</a:t>
+              <a:t>Version: </a:t>
+            </a:r>
+            <a:r>
+              <a:rPr lang="en-US" dirty="0" smtClean="0">
+                <a:latin typeface="Arial" pitchFamily="34" charset="0"/>
+                <a:cs typeface="Arial" pitchFamily="34" charset="0"/>
+              </a:rPr>
+              <a:t>0.3 </a:t>
+            </a:r>
+            <a:r>
+              <a:rPr lang="en-US" dirty="0" smtClean="0">
+                <a:latin typeface="Arial" pitchFamily="34" charset="0"/>
+                <a:cs typeface="Arial" pitchFamily="34" charset="0"/>
+              </a:rPr>
+              <a:t>DRAFT</a:t>
             </a:r>
             <a:endParaRPr lang="en-US" dirty="0">
               <a:latin typeface="Arial" pitchFamily="34" charset="0"/>
@@ -4941,8 +4961,8 @@
           <a:lstStyle/>
           <a:p>
             <a:r>
-              <a:rPr lang="nb-NO" dirty="0" smtClean="0"/>
-              <a:t>Indicators</a:t>
+              <a:rPr lang="nb-NO" dirty="0" err="1" smtClean="0"/>
+              <a:t>References</a:t>
             </a:r>
             <a:endParaRPr lang="nb-NO" dirty="0"/>
           </a:p>
@@ -4957,7 +4977,7 @@
         <p:spPr>
           <a:xfrm>
             <a:off x="0" y="2564482"/>
-            <a:ext cx="5143500" cy="3416320"/>
+            <a:ext cx="5143500" cy="2123658"/>
           </a:xfrm>
           <a:prstGeom prst="rect">
             <a:avLst/>
@@ -4970,527 +4990,64 @@
           </a:bodyPr>
           <a:lstStyle/>
           <a:p>
-            <a:pPr>
-              <a:buFont typeface="Arial" pitchFamily="34" charset="0"/>
-              <a:buChar char="•"/>
-            </a:pPr>
-            <a:r>
-              <a:rPr lang="nb-NO" sz="1200" dirty="0" smtClean="0"/>
-              <a:t>BM-21 </a:t>
-            </a:r>
-            <a:r>
-              <a:rPr lang="nb-NO" sz="1200" dirty="0" err="1" smtClean="0"/>
-              <a:t>launch</a:t>
-            </a:r>
-            <a:r>
-              <a:rPr lang="nb-NO" sz="1200" dirty="0" smtClean="0"/>
-              <a:t> or </a:t>
-            </a:r>
-            <a:r>
-              <a:rPr lang="nb-NO" sz="1200" dirty="0" err="1" smtClean="0"/>
-              <a:t>movement</a:t>
+            <a:r>
+              <a:rPr lang="nb-NO" sz="1200" dirty="0" smtClean="0">
+                <a:hlinkClick r:id="rId2"/>
+              </a:rPr>
+              <a:t>http://pdf.textfiles.com/manuals/MILITARY/united_states_army_fm_34-8x2%20-%201_may_1998%20-%20part03.pdf</a:t>
             </a:r>
             <a:r>
               <a:rPr lang="nb-NO" sz="1200" dirty="0" smtClean="0"/>
               <a:t> </a:t>
             </a:r>
-            <a:r>
-              <a:rPr lang="nb-NO" sz="1200" dirty="0" err="1" smtClean="0"/>
-              <a:t>into</a:t>
-            </a:r>
-            <a:r>
-              <a:rPr lang="nb-NO" sz="1200" dirty="0" smtClean="0"/>
-              <a:t> firing </a:t>
-            </a:r>
-            <a:r>
-              <a:rPr lang="nb-NO" sz="1200" dirty="0" err="1" smtClean="0"/>
-              <a:t>positions</a:t>
-            </a:r>
-            <a:r>
-              <a:rPr lang="nb-NO" sz="1200" dirty="0" smtClean="0"/>
-              <a:t>. </a:t>
-            </a:r>
-          </a:p>
-          <a:p>
-            <a:pPr lvl="1">
-              <a:buFont typeface="Arial" pitchFamily="34" charset="0"/>
-              <a:buChar char="•"/>
-            </a:pPr>
-            <a:r>
-              <a:rPr lang="nb-NO" sz="1200" dirty="0" smtClean="0"/>
-              <a:t>Preparing offensive / </a:t>
-            </a:r>
-            <a:r>
-              <a:rPr lang="nb-NO" sz="1200" dirty="0" err="1" smtClean="0"/>
-              <a:t>Attack</a:t>
-            </a:r>
+          </a:p>
+          <a:p>
             <a:endParaRPr lang="nb-NO" sz="1200" dirty="0" smtClean="0"/>
           </a:p>
           <a:p>
-            <a:pPr>
-              <a:buFont typeface="Arial" pitchFamily="34" charset="0"/>
-              <a:buChar char="•"/>
-            </a:pPr>
-            <a:r>
-              <a:rPr lang="nb-NO" sz="1200" dirty="0" smtClean="0"/>
-              <a:t>RW </a:t>
-            </a:r>
-            <a:r>
-              <a:rPr lang="nb-NO" sz="1200" dirty="0" err="1" smtClean="0"/>
-              <a:t>activity</a:t>
+            <a:r>
+              <a:rPr lang="nb-NO" sz="1200" dirty="0" smtClean="0">
+                <a:hlinkClick r:id="rId3"/>
+              </a:rPr>
+              <a:t>https://www.globalsecurity.org/military/library/policy/army/accp/is3001/lesson-5.htm</a:t>
             </a:r>
             <a:r>
               <a:rPr lang="nb-NO" sz="1200" dirty="0" smtClean="0"/>
               <a:t> </a:t>
             </a:r>
-            <a:r>
-              <a:rPr lang="nb-NO" sz="1200" dirty="0" err="1" smtClean="0"/>
-              <a:t>deep</a:t>
+          </a:p>
+          <a:p>
+            <a:endParaRPr lang="nb-NO" sz="1200" dirty="0" smtClean="0"/>
+          </a:p>
+          <a:p>
+            <a:r>
+              <a:rPr lang="nb-NO" sz="1200" dirty="0" smtClean="0">
+                <a:hlinkClick r:id="rId4"/>
+              </a:rPr>
+              <a:t>https://fas.org/irp/doddir/army/fm34-35/Appc.htm</a:t>
+            </a:r>
+            <a:endParaRPr lang="nb-NO" sz="1200" dirty="0" smtClean="0"/>
+          </a:p>
+          <a:p>
+            <a:endParaRPr lang="nb-NO" sz="1200" dirty="0" smtClean="0"/>
+          </a:p>
+          <a:p>
+            <a:r>
+              <a:rPr lang="nb-NO" sz="1200" dirty="0" smtClean="0">
+                <a:hlinkClick r:id="rId5"/>
+              </a:rPr>
+              <a:t>https://www.trngcmd.marines.mil/Portals/207/Docs/MCIS/ITEP/MCWP_2-3_MAGTF_Intelligence_Production_and_Analysis_5.pdf</a:t>
             </a:r>
             <a:r>
               <a:rPr lang="nb-NO" sz="1200" dirty="0" smtClean="0"/>
               <a:t> </a:t>
             </a:r>
-            <a:r>
-              <a:rPr lang="nb-NO" sz="1200" dirty="0" err="1" smtClean="0"/>
-              <a:t>into</a:t>
-            </a:r>
+          </a:p>
+          <a:p>
             <a:r>
               <a:rPr lang="nb-NO" sz="1200" dirty="0" smtClean="0"/>
               <a:t> </a:t>
             </a:r>
-            <a:r>
-              <a:rPr lang="nb-NO" sz="1200" dirty="0" err="1" smtClean="0"/>
-              <a:t>enemy</a:t>
-            </a:r>
-            <a:r>
-              <a:rPr lang="nb-NO" sz="1200" dirty="0" smtClean="0"/>
-              <a:t> </a:t>
-            </a:r>
-            <a:r>
-              <a:rPr lang="nb-NO" sz="1200" dirty="0" err="1" smtClean="0"/>
-              <a:t>territory</a:t>
-            </a:r>
-            <a:endParaRPr lang="nb-NO" sz="1200" dirty="0" smtClean="0"/>
-          </a:p>
-          <a:p>
-            <a:pPr lvl="1">
-              <a:buFont typeface="Arial" pitchFamily="34" charset="0"/>
-              <a:buChar char="•"/>
-            </a:pPr>
-            <a:r>
-              <a:rPr lang="nb-NO" sz="1200" dirty="0" err="1" smtClean="0"/>
-              <a:t>Insertion</a:t>
-            </a:r>
-            <a:r>
-              <a:rPr lang="nb-NO" sz="1200" dirty="0" smtClean="0"/>
-              <a:t> </a:t>
-            </a:r>
-            <a:r>
-              <a:rPr lang="nb-NO" sz="1200" dirty="0" err="1" smtClean="0"/>
-              <a:t>of</a:t>
-            </a:r>
-            <a:r>
-              <a:rPr lang="nb-NO" sz="1200" dirty="0" smtClean="0"/>
-              <a:t> Long Range </a:t>
-            </a:r>
-            <a:r>
-              <a:rPr lang="nb-NO" sz="1200" dirty="0" err="1" smtClean="0"/>
-              <a:t>Recon</a:t>
-            </a:r>
-            <a:endParaRPr lang="nb-NO" sz="1200" dirty="0" smtClean="0"/>
-          </a:p>
-          <a:p>
-            <a:pPr>
-              <a:buFont typeface="Arial" pitchFamily="34" charset="0"/>
-              <a:buChar char="•"/>
-            </a:pPr>
-            <a:r>
-              <a:rPr lang="nb-NO" sz="1200" dirty="0" smtClean="0"/>
-              <a:t>FW (transport) </a:t>
-            </a:r>
-            <a:r>
-              <a:rPr lang="nb-NO" sz="1200" dirty="0" err="1" smtClean="0"/>
-              <a:t>activity</a:t>
-            </a:r>
-            <a:r>
-              <a:rPr lang="nb-NO" sz="1200" dirty="0" smtClean="0"/>
-              <a:t> </a:t>
-            </a:r>
-            <a:r>
-              <a:rPr lang="nb-NO" sz="1200" dirty="0" err="1" smtClean="0"/>
-              <a:t>deep</a:t>
-            </a:r>
-            <a:r>
-              <a:rPr lang="nb-NO" sz="1200" dirty="0" smtClean="0"/>
-              <a:t> </a:t>
-            </a:r>
-            <a:r>
-              <a:rPr lang="nb-NO" sz="1200" dirty="0" err="1" smtClean="0"/>
-              <a:t>into</a:t>
-            </a:r>
-            <a:r>
-              <a:rPr lang="nb-NO" sz="1200" dirty="0" smtClean="0"/>
-              <a:t> </a:t>
-            </a:r>
-            <a:r>
-              <a:rPr lang="nb-NO" sz="1200" dirty="0" err="1" smtClean="0"/>
-              <a:t>enemy</a:t>
-            </a:r>
-            <a:r>
-              <a:rPr lang="nb-NO" sz="1200" dirty="0" smtClean="0"/>
-              <a:t> </a:t>
-            </a:r>
-            <a:r>
-              <a:rPr lang="nb-NO" sz="1200" dirty="0" err="1" smtClean="0"/>
-              <a:t>territory</a:t>
-            </a:r>
-            <a:endParaRPr lang="nb-NO" sz="1200" dirty="0" smtClean="0"/>
-          </a:p>
-          <a:p>
-            <a:pPr lvl="1">
-              <a:buFont typeface="Arial" pitchFamily="34" charset="0"/>
-              <a:buChar char="•"/>
-            </a:pPr>
-            <a:r>
-              <a:rPr lang="nb-NO" sz="1200" dirty="0" smtClean="0"/>
-              <a:t>Airborne </a:t>
-            </a:r>
-            <a:r>
-              <a:rPr lang="nb-NO" sz="1200" dirty="0" err="1" smtClean="0"/>
-              <a:t>Assault</a:t>
-            </a:r>
-            <a:r>
-              <a:rPr lang="nb-NO" sz="1200" dirty="0" smtClean="0"/>
-              <a:t> ( </a:t>
-            </a:r>
-            <a:r>
-              <a:rPr lang="nb-NO" sz="1200" dirty="0" err="1" smtClean="0"/>
-              <a:t>Many</a:t>
-            </a:r>
-            <a:r>
-              <a:rPr lang="nb-NO" sz="1200" dirty="0" smtClean="0"/>
-              <a:t> FW transports)</a:t>
-            </a:r>
-          </a:p>
-          <a:p>
-            <a:pPr lvl="1">
-              <a:buFont typeface="Arial" pitchFamily="34" charset="0"/>
-              <a:buChar char="•"/>
-            </a:pPr>
-            <a:r>
-              <a:rPr lang="nb-NO" sz="1200" dirty="0" smtClean="0"/>
-              <a:t>Long range </a:t>
-            </a:r>
-            <a:r>
-              <a:rPr lang="nb-NO" sz="1200" dirty="0" err="1" smtClean="0"/>
-              <a:t>Recon</a:t>
-            </a:r>
-            <a:r>
-              <a:rPr lang="nb-NO" sz="1200" dirty="0" smtClean="0"/>
-              <a:t> ( </a:t>
-            </a:r>
-            <a:r>
-              <a:rPr lang="nb-NO" sz="1200" dirty="0" err="1" smtClean="0"/>
-              <a:t>If</a:t>
-            </a:r>
-            <a:r>
-              <a:rPr lang="nb-NO" sz="1200" dirty="0" smtClean="0"/>
-              <a:t> </a:t>
-            </a:r>
-            <a:r>
-              <a:rPr lang="nb-NO" sz="1200" dirty="0" err="1" smtClean="0"/>
-              <a:t>only</a:t>
-            </a:r>
-            <a:r>
-              <a:rPr lang="nb-NO" sz="1200" dirty="0" smtClean="0"/>
-              <a:t> a single AC is in </a:t>
-            </a:r>
-            <a:r>
-              <a:rPr lang="nb-NO" sz="1200" dirty="0" err="1" smtClean="0"/>
-              <a:t>use</a:t>
-            </a:r>
-            <a:r>
-              <a:rPr lang="nb-NO" sz="1200" dirty="0" smtClean="0"/>
-              <a:t>, or flying </a:t>
-            </a:r>
-            <a:r>
-              <a:rPr lang="nb-NO" sz="1200" dirty="0" err="1" smtClean="0"/>
-              <a:t>tactical</a:t>
-            </a:r>
-            <a:r>
-              <a:rPr lang="nb-NO" sz="1200" dirty="0" smtClean="0"/>
-              <a:t>, </a:t>
-            </a:r>
-            <a:r>
-              <a:rPr lang="nb-NO" sz="1200" dirty="0" err="1" smtClean="0"/>
-              <a:t>low</a:t>
-            </a:r>
-            <a:r>
-              <a:rPr lang="nb-NO" sz="1200" dirty="0" smtClean="0"/>
-              <a:t> </a:t>
-            </a:r>
-            <a:r>
-              <a:rPr lang="nb-NO" sz="1200" dirty="0" err="1" smtClean="0"/>
-              <a:t>level</a:t>
-            </a:r>
-            <a:r>
-              <a:rPr lang="nb-NO" sz="1200" dirty="0" smtClean="0"/>
-              <a:t>)</a:t>
-            </a:r>
-          </a:p>
-          <a:p>
-            <a:pPr>
-              <a:buFont typeface="Arial" pitchFamily="34" charset="0"/>
-              <a:buChar char="•"/>
-            </a:pPr>
-            <a:r>
-              <a:rPr lang="nb-NO" sz="1200" dirty="0" err="1" smtClean="0"/>
-              <a:t>Artillery</a:t>
-            </a:r>
-            <a:r>
-              <a:rPr lang="nb-NO" sz="1200" dirty="0" smtClean="0"/>
-              <a:t> at a </a:t>
-            </a:r>
-            <a:r>
-              <a:rPr lang="nb-NO" sz="1200" dirty="0" err="1" smtClean="0"/>
-              <a:t>certain</a:t>
-            </a:r>
-            <a:r>
-              <a:rPr lang="nb-NO" sz="1200" dirty="0" smtClean="0"/>
-              <a:t> </a:t>
-            </a:r>
-            <a:r>
-              <a:rPr lang="nb-NO" sz="1200" dirty="0" err="1" smtClean="0"/>
-              <a:t>point</a:t>
-            </a:r>
-            <a:r>
-              <a:rPr lang="nb-NO" sz="1200" dirty="0" smtClean="0"/>
-              <a:t> (</a:t>
-            </a:r>
-            <a:r>
-              <a:rPr lang="nb-NO" sz="1200" dirty="0" err="1" smtClean="0"/>
-              <a:t>point</a:t>
-            </a:r>
-            <a:r>
-              <a:rPr lang="nb-NO" sz="1200" dirty="0" smtClean="0"/>
-              <a:t> target)</a:t>
-            </a:r>
-          </a:p>
-          <a:p>
-            <a:pPr lvl="1">
-              <a:buFont typeface="Arial" pitchFamily="34" charset="0"/>
-              <a:buChar char="•"/>
-            </a:pPr>
-            <a:r>
-              <a:rPr lang="nb-NO" sz="1200" dirty="0" err="1" smtClean="0"/>
-              <a:t>Trying</a:t>
-            </a:r>
-            <a:r>
-              <a:rPr lang="nb-NO" sz="1200" dirty="0" smtClean="0"/>
-              <a:t> to kill </a:t>
-            </a:r>
-            <a:r>
-              <a:rPr lang="nb-NO" sz="1200" dirty="0" err="1" smtClean="0"/>
-              <a:t>the</a:t>
-            </a:r>
-            <a:r>
-              <a:rPr lang="nb-NO" sz="1200" dirty="0" smtClean="0"/>
-              <a:t> target</a:t>
-            </a:r>
-          </a:p>
-          <a:p>
-            <a:pPr>
-              <a:buFont typeface="Arial" pitchFamily="34" charset="0"/>
-              <a:buChar char="•"/>
-            </a:pPr>
-            <a:r>
-              <a:rPr lang="nb-NO" sz="1200" dirty="0" err="1" smtClean="0"/>
-              <a:t>Artillery</a:t>
-            </a:r>
-            <a:r>
-              <a:rPr lang="nb-NO" sz="1200" dirty="0" smtClean="0"/>
-              <a:t> at an area</a:t>
-            </a:r>
-          </a:p>
-          <a:p>
-            <a:pPr lvl="1">
-              <a:buFont typeface="Arial" pitchFamily="34" charset="0"/>
-              <a:buChar char="•"/>
-            </a:pPr>
-            <a:r>
-              <a:rPr lang="nb-NO" sz="1200" dirty="0" err="1" smtClean="0"/>
-              <a:t>Suppression</a:t>
-            </a:r>
-            <a:r>
-              <a:rPr lang="nb-NO" sz="1200" dirty="0" smtClean="0"/>
-              <a:t>, to cover for </a:t>
-            </a:r>
-            <a:r>
-              <a:rPr lang="nb-NO" sz="1200" dirty="0" err="1" smtClean="0"/>
-              <a:t>movement</a:t>
-            </a:r>
-            <a:r>
-              <a:rPr lang="nb-NO" sz="1200" dirty="0" smtClean="0"/>
-              <a:t> / </a:t>
-            </a:r>
-            <a:r>
-              <a:rPr lang="nb-NO" sz="1200" dirty="0" err="1" smtClean="0"/>
-              <a:t>attack</a:t>
-            </a:r>
-            <a:endParaRPr lang="nb-NO" sz="1200" dirty="0" smtClean="0"/>
-          </a:p>
-          <a:p>
-            <a:pPr>
-              <a:buFont typeface="Arial" pitchFamily="34" charset="0"/>
-              <a:buChar char="•"/>
-            </a:pPr>
-            <a:r>
-              <a:rPr lang="nb-NO" sz="1200" dirty="0" smtClean="0"/>
-              <a:t>Fill </a:t>
-            </a:r>
-            <a:r>
-              <a:rPr lang="nb-NO" sz="1200" dirty="0" err="1" smtClean="0"/>
-              <a:t>out</a:t>
-            </a:r>
-            <a:r>
-              <a:rPr lang="nb-NO" sz="1200" dirty="0" smtClean="0"/>
-              <a:t> </a:t>
-            </a:r>
-            <a:r>
-              <a:rPr lang="nb-NO" sz="1200" dirty="0" err="1" smtClean="0"/>
-              <a:t>many</a:t>
-            </a:r>
-            <a:r>
-              <a:rPr lang="nb-NO" sz="1200" dirty="0" smtClean="0"/>
-              <a:t> more…..</a:t>
-            </a:r>
-          </a:p>
-          <a:p>
-            <a:pPr>
-              <a:buFont typeface="Arial" pitchFamily="34" charset="0"/>
-              <a:buChar char="•"/>
-            </a:pPr>
-            <a:endParaRPr lang="nb-NO" sz="1200" dirty="0" smtClean="0"/>
-          </a:p>
-          <a:p>
-            <a:pPr>
-              <a:buFont typeface="Arial" pitchFamily="34" charset="0"/>
-              <a:buChar char="•"/>
-            </a:pPr>
-            <a:r>
-              <a:rPr lang="nb-NO" sz="1200" dirty="0" err="1" smtClean="0"/>
-              <a:t>Artillery</a:t>
-            </a:r>
-            <a:r>
-              <a:rPr lang="nb-NO" sz="1200" dirty="0" smtClean="0"/>
-              <a:t> </a:t>
-            </a:r>
-            <a:r>
-              <a:rPr lang="nb-NO" sz="1200" dirty="0" err="1" smtClean="0"/>
-              <a:t>units</a:t>
-            </a:r>
-            <a:r>
-              <a:rPr lang="nb-NO" sz="1200" dirty="0" smtClean="0"/>
-              <a:t> in firing </a:t>
-            </a:r>
-            <a:r>
-              <a:rPr lang="nb-NO" sz="1200" dirty="0" err="1" smtClean="0"/>
-              <a:t>position</a:t>
-            </a:r>
-            <a:r>
-              <a:rPr lang="nb-NO" sz="1200" dirty="0" smtClean="0"/>
-              <a:t> (</a:t>
-            </a:r>
-            <a:r>
-              <a:rPr lang="nb-NO" sz="1200" dirty="0" err="1" smtClean="0"/>
-              <a:t>spread</a:t>
-            </a:r>
-            <a:r>
-              <a:rPr lang="nb-NO" sz="1200" dirty="0" smtClean="0"/>
-              <a:t> </a:t>
-            </a:r>
-            <a:r>
-              <a:rPr lang="nb-NO" sz="1200" dirty="0" err="1" smtClean="0"/>
-              <a:t>out</a:t>
-            </a:r>
-            <a:r>
-              <a:rPr lang="nb-NO" sz="1200" dirty="0" smtClean="0"/>
-              <a:t>, IAW a </a:t>
-            </a:r>
-            <a:r>
-              <a:rPr lang="nb-NO" sz="1200" dirty="0" err="1" smtClean="0"/>
-              <a:t>template</a:t>
-            </a:r>
-            <a:r>
-              <a:rPr lang="nb-NO" sz="1200" dirty="0" smtClean="0"/>
-              <a:t>)</a:t>
-            </a:r>
-            <a:endParaRPr lang="nb-NO" sz="1200" dirty="0"/>
-          </a:p>
-          <a:p>
-            <a:pPr>
-              <a:buFont typeface="Arial" pitchFamily="34" charset="0"/>
-              <a:buChar char="•"/>
-            </a:pPr>
-            <a:r>
-              <a:rPr lang="nb-NO" sz="1200" dirty="0" smtClean="0"/>
-              <a:t>General </a:t>
-            </a:r>
-            <a:r>
-              <a:rPr lang="nb-NO" sz="1200" dirty="0" err="1" smtClean="0"/>
-              <a:t>convoy</a:t>
-            </a:r>
-            <a:r>
-              <a:rPr lang="nb-NO" sz="1200" dirty="0" smtClean="0"/>
-              <a:t> </a:t>
-            </a:r>
-            <a:r>
-              <a:rPr lang="nb-NO" sz="1200" dirty="0" err="1" smtClean="0"/>
-              <a:t>movement</a:t>
-            </a:r>
-            <a:endParaRPr lang="nb-NO" sz="1200" dirty="0" smtClean="0"/>
-          </a:p>
-          <a:p>
-            <a:pPr lvl="1">
-              <a:buFont typeface="Arial" pitchFamily="34" charset="0"/>
-              <a:buChar char="•"/>
-            </a:pPr>
-            <a:r>
-              <a:rPr lang="nb-NO" sz="1200" dirty="0" err="1" smtClean="0"/>
-              <a:t>Upcoming</a:t>
-            </a:r>
-            <a:r>
-              <a:rPr lang="nb-NO" sz="1200" dirty="0" smtClean="0"/>
-              <a:t> action (offensive), in a </a:t>
-            </a:r>
-            <a:r>
-              <a:rPr lang="nb-NO" sz="1200" dirty="0" err="1" smtClean="0"/>
-              <a:t>certian</a:t>
-            </a:r>
-            <a:r>
-              <a:rPr lang="nb-NO" sz="1200" dirty="0" smtClean="0"/>
-              <a:t> </a:t>
-            </a:r>
-            <a:r>
-              <a:rPr lang="nb-NO" sz="1200" dirty="0" err="1" smtClean="0"/>
-              <a:t>amount</a:t>
-            </a:r>
-            <a:r>
-              <a:rPr lang="nb-NO" sz="1200" dirty="0" smtClean="0"/>
-              <a:t> </a:t>
-            </a:r>
-            <a:r>
-              <a:rPr lang="nb-NO" sz="1200" dirty="0" err="1" smtClean="0"/>
-              <a:t>of</a:t>
-            </a:r>
-            <a:r>
-              <a:rPr lang="nb-NO" sz="1200" dirty="0" smtClean="0"/>
-              <a:t> time</a:t>
-            </a:r>
-          </a:p>
-          <a:p>
-            <a:endParaRPr lang="nb-NO" sz="1200" dirty="0" smtClean="0"/>
           </a:p>
         </p:txBody>
       </p:sp>
@@ -5526,11 +5083,27 @@
             </a:r>
             <a:r>
               <a:rPr lang="nb-NO" dirty="0" smtClean="0"/>
-              <a:t> </a:t>
+              <a:t> links </a:t>
             </a:r>
             <a:r>
               <a:rPr lang="nb-NO" dirty="0" err="1" smtClean="0"/>
-              <a:t>indicators</a:t>
+              <a:t>can</a:t>
+            </a:r>
+            <a:r>
+              <a:rPr lang="nb-NO" dirty="0" smtClean="0"/>
+              <a:t> be used to </a:t>
+            </a:r>
+            <a:r>
+              <a:rPr lang="nb-NO" dirty="0" err="1" smtClean="0"/>
+              <a:t>gain</a:t>
+            </a:r>
+            <a:r>
+              <a:rPr lang="nb-NO" dirty="0" smtClean="0"/>
+              <a:t> a </a:t>
+            </a:r>
+            <a:r>
+              <a:rPr lang="nb-NO" dirty="0" err="1" smtClean="0"/>
+              <a:t>deeper</a:t>
             </a:r>
             <a:r>
               <a:rPr lang="nb-NO" dirty="0" smtClean="0"/>
@@ -5538,7 +5111,7 @@
             </a:r>
             <a:r>
               <a:rPr lang="nb-NO" dirty="0" err="1" smtClean="0"/>
-              <a:t>can</a:t>
+              <a:t>understanding</a:t>
             </a:r>
             <a:r>
               <a:rPr lang="nb-NO" dirty="0" smtClean="0"/>
@@ -5546,7 +5119,7 @@
             </a:r>
             <a:r>
               <a:rPr lang="nb-NO" dirty="0" err="1" smtClean="0"/>
-              <a:t>aid</a:t>
+              <a:t>of</a:t>
             </a:r>
             <a:r>
               <a:rPr lang="nb-NO" dirty="0" smtClean="0"/>
@@ -5562,11 +5135,11 @@
             </a:r>
             <a:r>
               <a:rPr lang="nb-NO" dirty="0" err="1" smtClean="0"/>
-              <a:t>assessments</a:t>
+              <a:t>military</a:t>
             </a:r>
             <a:r>
               <a:rPr lang="nb-NO" dirty="0" smtClean="0"/>
-              <a:t> for </a:t>
+              <a:t> </a:t>
             </a:r>
             <a:r>
               <a:rPr lang="nb-NO" dirty="0" err="1" smtClean="0"/>
@@ -5578,316 +5151,7 @@
             </a:r>
             <a:r>
               <a:rPr lang="nb-NO" dirty="0" err="1" smtClean="0"/>
-              <a:t>reports</a:t>
-            </a:r>
-            <a:r>
-              <a:rPr lang="nb-NO" dirty="0" smtClean="0"/>
-              <a:t> or </a:t>
-            </a:r>
-            <a:r>
-              <a:rPr lang="nb-NO" dirty="0" err="1" smtClean="0"/>
-              <a:t>intelligence</a:t>
-            </a:r>
-            <a:r>
-              <a:rPr lang="nb-NO" dirty="0" smtClean="0"/>
-              <a:t> </a:t>
-            </a:r>
-            <a:r>
-              <a:rPr lang="nb-NO" dirty="0" err="1" smtClean="0"/>
-              <a:t>summaries</a:t>
-            </a:r>
-            <a:endParaRPr lang="nb-NO" dirty="0"/>
-          </a:p>
-        </p:txBody>
-      </p:sp>
-      <p:sp>
-        <p:nvSpPr>
-          <p:cNvPr id="5" name="TekstSylinder 4"/>
-          <p:cNvSpPr txBox="1"/>
-          <p:nvPr/>
-        </p:nvSpPr>
-        <p:spPr>
-          <a:xfrm rot="19521515">
-            <a:off x="2064646" y="4156057"/>
-            <a:ext cx="2304256" cy="707886"/>
-          </a:xfrm>
-          <a:prstGeom prst="rect">
-            <a:avLst/>
-          </a:prstGeom>
-          <a:solidFill>
-            <a:schemeClr val="bg1">
-              <a:alpha val="50000"/>
-            </a:schemeClr>
-          </a:solidFill>
-          <a:ln>
-            <a:solidFill>
-              <a:srgbClr val="FF0000"/>
-            </a:solidFill>
-          </a:ln>
-        </p:spPr>
-        <p:txBody>
-          <a:bodyPr wrap="square" rtlCol="0" anchor="ctr">
-            <a:spAutoFit/>
-          </a:bodyPr>
-          <a:lstStyle/>
-          <a:p>
-            <a:pPr algn="ctr"/>
-            <a:r>
-              <a:rPr lang="en-US" sz="4000" b="1" dirty="0" smtClean="0">
-                <a:solidFill>
-                  <a:srgbClr val="FF0000"/>
-                </a:solidFill>
-              </a:rPr>
-              <a:t>WIP</a:t>
-            </a:r>
-            <a:endParaRPr lang="en-US" sz="4000" b="1" dirty="0">
-              <a:solidFill>
-                <a:srgbClr val="FF0000"/>
-              </a:solidFill>
-            </a:endParaRPr>
-          </a:p>
-        </p:txBody>
-      </p:sp>
-    </p:spTree>
-  </p:cSld>
-  <p:clrMapOvr>
-    <a:masterClrMapping/>
-  </p:clrMapOvr>
-  <p:transition/>
-  <p:timing>
-    <p:tnLst>
-      <p:par>
-        <p:cTn id="1" dur="indefinite" restart="never" nodeType="tmRoot"/>
-      </p:par>
-    </p:tnLst>
-  </p:timing>
-</p:sld>
-</file>
-
-<file path=ppt/slides/slide15.xml><?xml version="1.0" encoding="utf-8"?>
-<p:sld xmlns:a="http://schemas.openxmlformats.org/drawingml/2006/main" xmlns:r="http://schemas.openxmlformats.org/officeDocument/2006/relationships" xmlns:p="http://schemas.openxmlformats.org/presentationml/2006/main">
-  <p:cSld>
-    <p:spTree>
-      <p:nvGrpSpPr>
-        <p:cNvPr id="1" name=""/>
-        <p:cNvGrpSpPr/>
-        <p:nvPr/>
-      </p:nvGrpSpPr>
-      <p:grpSpPr>
-        <a:xfrm>
-          <a:off x="0" y="0"/>
-          <a:ext cx="0" cy="0"/>
-          <a:chOff x="0" y="0"/>
-          <a:chExt cx="0" cy="0"/>
-        </a:xfrm>
-      </p:grpSpPr>
-      <p:sp>
-        <p:nvSpPr>
-          <p:cNvPr id="2" name="Tittel 1"/>
-          <p:cNvSpPr>
-            <a:spLocks noGrp="1"/>
-          </p:cNvSpPr>
-          <p:nvPr>
-            <p:ph type="title"/>
-          </p:nvPr>
-        </p:nvSpPr>
-        <p:spPr/>
-        <p:txBody>
-          <a:bodyPr/>
-          <a:lstStyle/>
-          <a:p>
-            <a:r>
-              <a:rPr lang="nb-NO" dirty="0" err="1" smtClean="0"/>
-              <a:t>References</a:t>
-            </a:r>
-            <a:endParaRPr lang="nb-NO" dirty="0"/>
-          </a:p>
-        </p:txBody>
-      </p:sp>
-      <p:sp>
-        <p:nvSpPr>
-          <p:cNvPr id="3" name="TekstSylinder 2"/>
-          <p:cNvSpPr txBox="1"/>
-          <p:nvPr/>
-        </p:nvSpPr>
-        <p:spPr>
-          <a:xfrm>
-            <a:off x="0" y="2564482"/>
-            <a:ext cx="5143500" cy="2123658"/>
-          </a:xfrm>
-          <a:prstGeom prst="rect">
-            <a:avLst/>
-          </a:prstGeom>
-          <a:noFill/>
-        </p:spPr>
-        <p:txBody>
-          <a:bodyPr wrap="square" rtlCol="0">
-            <a:spAutoFit/>
-          </a:bodyPr>
-          <a:lstStyle/>
-          <a:p>
-            <a:r>
-              <a:rPr lang="nb-NO" sz="1200" dirty="0" smtClean="0">
-                <a:hlinkClick r:id="rId2"/>
-              </a:rPr>
-              <a:t>http://pdf.textfiles.com/manuals/MILITARY/united_states_army_fm_34-8x2%20-%201_may_1998%20-%20part03.pdf</a:t>
-            </a:r>
-            <a:r>
-              <a:rPr lang="nb-NO" sz="1200" dirty="0" smtClean="0"/>
-              <a:t> </a:t>
-            </a:r>
-          </a:p>
-          <a:p>
-            <a:endParaRPr lang="nb-NO" sz="1200" dirty="0" smtClean="0"/>
-          </a:p>
-          <a:p>
-            <a:r>
-              <a:rPr lang="nb-NO" sz="1200" dirty="0" smtClean="0">
-                <a:hlinkClick r:id="rId3"/>
-              </a:rPr>
-              <a:t>https://www.globalsecurity.org/military/library/policy/army/accp/is3001/lesson-5.htm</a:t>
-            </a:r>
-            <a:r>
-              <a:rPr lang="nb-NO" sz="1200" dirty="0" smtClean="0"/>
-              <a:t> </a:t>
-            </a:r>
-          </a:p>
-          <a:p>
-            <a:endParaRPr lang="nb-NO" sz="1200" dirty="0" smtClean="0"/>
-          </a:p>
-          <a:p>
-            <a:r>
-              <a:rPr lang="nb-NO" sz="1200" dirty="0" smtClean="0">
-                <a:hlinkClick r:id="rId4"/>
-              </a:rPr>
-              <a:t>https://fas.org/irp/doddir/army/fm34-35/Appc.htm</a:t>
-            </a:r>
-            <a:endParaRPr lang="nb-NO" sz="1200" dirty="0" smtClean="0"/>
-          </a:p>
-          <a:p>
-            <a:endParaRPr lang="nb-NO" sz="1200" dirty="0" smtClean="0"/>
-          </a:p>
-          <a:p>
-            <a:r>
-              <a:rPr lang="nb-NO" sz="1200" dirty="0" smtClean="0">
-                <a:hlinkClick r:id="rId5"/>
-              </a:rPr>
-              <a:t>https://www.trngcmd.marines.mil/Portals/207/Docs/MCIS/ITEP/MCWP_2-3_MAGTF_Intelligence_Production_and_Analysis_5.pdf</a:t>
-            </a:r>
-            <a:r>
-              <a:rPr lang="nb-NO" sz="1200" dirty="0" smtClean="0"/>
-              <a:t> </a:t>
-            </a:r>
-          </a:p>
-          <a:p>
-            <a:r>
-              <a:rPr lang="nb-NO" sz="1200" dirty="0" smtClean="0"/>
-              <a:t> </a:t>
-            </a:r>
-          </a:p>
-        </p:txBody>
-      </p:sp>
-      <p:sp>
-        <p:nvSpPr>
-          <p:cNvPr id="4" name="TekstSylinder 3"/>
-          <p:cNvSpPr txBox="1"/>
-          <p:nvPr/>
-        </p:nvSpPr>
-        <p:spPr>
-          <a:xfrm>
-            <a:off x="0" y="1071538"/>
-            <a:ext cx="5143500" cy="646331"/>
-          </a:xfrm>
-          <a:prstGeom prst="rect">
-            <a:avLst/>
-          </a:prstGeom>
-          <a:noFill/>
-        </p:spPr>
-        <p:txBody>
-          <a:bodyPr wrap="square" rtlCol="0">
-            <a:spAutoFit/>
-          </a:bodyPr>
-          <a:lstStyle/>
-          <a:p>
-            <a:r>
-              <a:rPr lang="nb-NO" dirty="0" smtClean="0"/>
-              <a:t>The </a:t>
-            </a:r>
-            <a:r>
-              <a:rPr lang="nb-NO" dirty="0" err="1" smtClean="0"/>
-              <a:t>following</a:t>
-            </a:r>
-            <a:r>
-              <a:rPr lang="nb-NO" dirty="0" smtClean="0"/>
-              <a:t> </a:t>
-            </a:r>
-            <a:r>
-              <a:rPr lang="nb-NO" dirty="0" err="1" smtClean="0"/>
-              <a:t>indicators</a:t>
-            </a:r>
-            <a:r>
-              <a:rPr lang="nb-NO" dirty="0" smtClean="0"/>
-              <a:t> </a:t>
-            </a:r>
-            <a:r>
-              <a:rPr lang="nb-NO" dirty="0" err="1" smtClean="0"/>
-              <a:t>can</a:t>
-            </a:r>
-            <a:r>
-              <a:rPr lang="nb-NO" dirty="0" smtClean="0"/>
-              <a:t> </a:t>
-            </a:r>
-            <a:r>
-              <a:rPr lang="nb-NO" dirty="0" err="1" smtClean="0"/>
-              <a:t>aid</a:t>
-            </a:r>
-            <a:r>
-              <a:rPr lang="nb-NO" dirty="0" smtClean="0"/>
-              <a:t> </a:t>
-            </a:r>
-            <a:r>
-              <a:rPr lang="nb-NO" dirty="0" err="1" smtClean="0"/>
-              <a:t>the</a:t>
-            </a:r>
-            <a:r>
-              <a:rPr lang="nb-NO" dirty="0" smtClean="0"/>
-              <a:t> </a:t>
-            </a:r>
-            <a:r>
-              <a:rPr lang="nb-NO" dirty="0" err="1" smtClean="0"/>
-              <a:t>assessments</a:t>
-            </a:r>
-            <a:r>
-              <a:rPr lang="nb-NO" dirty="0" smtClean="0"/>
-              <a:t> for </a:t>
-            </a:r>
-            <a:r>
-              <a:rPr lang="nb-NO" dirty="0" err="1" smtClean="0"/>
-              <a:t>intelligence</a:t>
-            </a:r>
-            <a:r>
-              <a:rPr lang="nb-NO" dirty="0" smtClean="0"/>
-              <a:t> </a:t>
-            </a:r>
-            <a:r>
-              <a:rPr lang="nb-NO" dirty="0" err="1" smtClean="0"/>
-              <a:t>reports</a:t>
-            </a:r>
-            <a:r>
-              <a:rPr lang="nb-NO" dirty="0" smtClean="0"/>
-              <a:t> or </a:t>
-            </a:r>
-            <a:r>
-              <a:rPr lang="nb-NO" dirty="0" err="1" smtClean="0"/>
-              <a:t>intelligence</a:t>
-            </a:r>
-            <a:r>
-              <a:rPr lang="nb-NO" dirty="0" smtClean="0"/>
-              <a:t> </a:t>
-            </a:r>
-            <a:r>
-              <a:rPr lang="nb-NO" dirty="0" err="1" smtClean="0"/>
-              <a:t>summaries</a:t>
+              <a:t>function</a:t>
             </a:r>
             <a:endParaRPr lang="nb-NO" dirty="0"/>
           </a:p>
@@ -6256,7 +5520,7 @@
         </p:nvGraphicFramePr>
         <p:xfrm>
           <a:off x="0" y="1259638"/>
-          <a:ext cx="5143500" cy="6520185"/>
+          <a:ext cx="5143500" cy="6639941"/>
         </p:xfrm>
         <a:graphic>
           <a:graphicData uri="http://schemas.openxmlformats.org/drawingml/2006/table">
@@ -6376,6 +5640,10 @@
                     <a:bodyPr/>
                     <a:lstStyle/>
                     <a:p>
+                      <a:r>
+                        <a:rPr lang="en-US" sz="1200" dirty="0" smtClean="0"/>
+                        <a:t>0.3 (DRAFT)</a:t>
+                      </a:r>
                       <a:endParaRPr lang="en-US" sz="1200" dirty="0"/>
                     </a:p>
                   </a:txBody>
@@ -6386,7 +5654,11 @@
                     <a:bodyPr/>
                     <a:lstStyle/>
                     <a:p>
-                      <a:endParaRPr lang="en-US" sz="1200"/>
+                      <a:r>
+                        <a:rPr lang="en-US" sz="1200" dirty="0" smtClean="0"/>
+                        <a:t>2020-08-04</a:t>
+                      </a:r>
+                      <a:endParaRPr lang="en-US" sz="1200" dirty="0"/>
                     </a:p>
                   </a:txBody>
                   <a:tcPr/>
@@ -6396,7 +5668,21 @@
                     <a:bodyPr/>
                     <a:lstStyle/>
                     <a:p>
-                      <a:endParaRPr lang="en-US" sz="1200"/>
+                      <a:r>
+                        <a:rPr lang="en-US" sz="1200" dirty="0" smtClean="0"/>
+                        <a:t>- Removed</a:t>
+                      </a:r>
+                      <a:r>
+                        <a:rPr lang="en-US" sz="1200" baseline="0" dirty="0" smtClean="0"/>
+                        <a:t> indicators(will be operation specific)</a:t>
+                      </a:r>
+                    </a:p>
+                    <a:p>
+                      <a:r>
+                        <a:rPr lang="en-US" sz="1200" baseline="0" dirty="0" smtClean="0"/>
+                        <a:t>- Added references</a:t>
+                      </a:r>
+                      <a:endParaRPr lang="en-US" sz="1200" dirty="0"/>
                     </a:p>
                   </a:txBody>
                   <a:tcPr/>
@@ -6460,7 +5746,7 @@
                     <a:bodyPr/>
                     <a:lstStyle/>
                     <a:p>
-                      <a:endParaRPr lang="en-US" sz="1200"/>
+                      <a:endParaRPr lang="en-US" sz="1200" dirty="0"/>
                     </a:p>
                   </a:txBody>
                   <a:tcPr/>
@@ -6977,7 +6263,6 @@
               <a:rPr lang="en-US" b="1" dirty="0" smtClean="0"/>
               <a:t>Intelligence to pilots:</a:t>
             </a:r>
-            <a:endParaRPr lang="en-US" b="1" dirty="0" smtClean="0"/>
           </a:p>
           <a:p>
             <a:r>
@@ -7151,12 +6436,12 @@
               <a:t>Analysis: This is where the VIS staff look into the information </a:t>
             </a:r>
             <a:r>
-              <a:rPr lang="en-US" dirty="0" err="1" smtClean="0"/>
-              <a:t>availeble</a:t>
-            </a:r>
-            <a:r>
               <a:rPr lang="en-US" dirty="0" smtClean="0"/>
-              <a:t>, other intelligence reports, and conducts its best assessment of the situation to give a understanding on what is happening.</a:t>
+              <a:t>available, </a:t>
+            </a:r>
+            <a:r>
+              <a:rPr lang="en-US" dirty="0" smtClean="0"/>
+              <a:t>other intelligence reports, and conducts its best assessment of the situation to give a understanding on what is happening.</a:t>
             </a:r>
           </a:p>
           <a:p>
@@ -7266,7 +6551,15 @@
           <a:p>
             <a:r>
               <a:rPr lang="en-US" dirty="0" smtClean="0"/>
-              <a:t>Virtual Intelligence Service (VIS) produce three different of reports. </a:t>
+              <a:t>Virtual Intelligence Service (VIS) </a:t>
+            </a:r>
+            <a:r>
+              <a:rPr lang="en-US" dirty="0" smtClean="0"/>
+              <a:t>can produce </a:t>
+            </a:r>
+            <a:r>
+              <a:rPr lang="en-US" dirty="0" smtClean="0"/>
+              <a:t>three different of reports. </a:t>
             </a:r>
           </a:p>
           <a:p>
@@ -7444,12 +6737,12 @@
               <a:t>Virtual Intelligence Service (VIS) can </a:t>
             </a:r>
             <a:r>
-              <a:rPr lang="en-US" dirty="0" err="1" smtClean="0"/>
-              <a:t>recive</a:t>
-            </a:r>
-            <a:r>
               <a:rPr lang="en-US" dirty="0" smtClean="0"/>
-              <a:t> input from several sources:</a:t>
+              <a:t>receive </a:t>
+            </a:r>
+            <a:r>
+              <a:rPr lang="en-US" dirty="0" smtClean="0"/>
+              <a:t>input from several sources:</a:t>
             </a:r>
           </a:p>
           <a:p>

</xml_diff>

<commit_message>
chg: Update to VIS instructions
</commit_message>
<xml_diff>
--- a/VIS WORKSPACE/VIS Instructions.pptx
+++ b/VIS WORKSPACE/VIS Instructions.pptx
@@ -5,7 +5,7 @@
     <p:sldMasterId id="2147483648" r:id="rId1"/>
   </p:sldMasterIdLst>
   <p:notesMasterIdLst>
-    <p:notesMasterId r:id="rId16"/>
+    <p:notesMasterId r:id="rId17"/>
   </p:notesMasterIdLst>
   <p:sldIdLst>
     <p:sldId id="257" r:id="rId2"/>
@@ -17,11 +17,12 @@
     <p:sldId id="362" r:id="rId8"/>
     <p:sldId id="363" r:id="rId9"/>
     <p:sldId id="359" r:id="rId10"/>
-    <p:sldId id="358" r:id="rId11"/>
-    <p:sldId id="356" r:id="rId12"/>
-    <p:sldId id="357" r:id="rId13"/>
-    <p:sldId id="360" r:id="rId14"/>
-    <p:sldId id="364" r:id="rId15"/>
+    <p:sldId id="366" r:id="rId11"/>
+    <p:sldId id="358" r:id="rId12"/>
+    <p:sldId id="356" r:id="rId13"/>
+    <p:sldId id="357" r:id="rId14"/>
+    <p:sldId id="360" r:id="rId15"/>
+    <p:sldId id="364" r:id="rId16"/>
   </p:sldIdLst>
   <p:sldSz cx="5143500" cy="9144000" type="screen16x9"/>
   <p:notesSz cx="6858000" cy="9144000"/>
@@ -206,7 +207,7 @@
             <a:fld id="{40637A30-8EE1-4060-9976-8832FC89EE34}" type="datetimeFigureOut">
               <a:rPr lang="nb-NO" smtClean="0"/>
               <a:pPr/>
-              <a:t>04.08.2020</a:t>
+              <a:t>15.10.2020</a:t>
             </a:fld>
             <a:endParaRPr lang="nb-NO"/>
           </a:p>
@@ -4050,7 +4051,7 @@
                 <a:latin typeface="Arial" pitchFamily="34" charset="0"/>
                 <a:cs typeface="Arial" pitchFamily="34" charset="0"/>
               </a:rPr>
-              <a:t>2020-08-04</a:t>
+              <a:t>2020-10-15</a:t>
             </a:r>
             <a:endParaRPr lang="en-US" dirty="0">
               <a:latin typeface="Arial" pitchFamily="34" charset="0"/>
@@ -4094,7 +4095,7 @@
                 <a:latin typeface="Arial" pitchFamily="34" charset="0"/>
                 <a:cs typeface="Arial" pitchFamily="34" charset="0"/>
               </a:rPr>
-              <a:t>0.3 </a:t>
+              <a:t>0.4 </a:t>
             </a:r>
             <a:r>
               <a:rPr lang="en-US" dirty="0" smtClean="0">
@@ -4269,16 +4270,39 @@
           <a:chExt cx="0" cy="0"/>
         </a:xfrm>
       </p:grpSpPr>
+      <p:sp>
+        <p:nvSpPr>
+          <p:cNvPr id="2" name="Tittel 1"/>
+          <p:cNvSpPr>
+            <a:spLocks noGrp="1"/>
+          </p:cNvSpPr>
+          <p:nvPr>
+            <p:ph type="title"/>
+          </p:nvPr>
+        </p:nvSpPr>
+        <p:spPr/>
+        <p:txBody>
+          <a:bodyPr/>
+          <a:lstStyle/>
+          <a:p>
+            <a:r>
+              <a:rPr lang="nb-NO" dirty="0" smtClean="0"/>
+              <a:t>LEGEND</a:t>
+            </a:r>
+            <a:endParaRPr lang="nb-NO" dirty="0"/>
+          </a:p>
+        </p:txBody>
+      </p:sp>
       <p:pic>
         <p:nvPicPr>
-          <p:cNvPr id="2" name="Picture 2"/>
+          <p:cNvPr id="3" name="Picture 2"/>
           <p:cNvPicPr>
             <a:picLocks noChangeAspect="1" noChangeArrowheads="1"/>
           </p:cNvPicPr>
           <p:nvPr/>
         </p:nvPicPr>
         <p:blipFill>
-          <a:blip r:embed="rId2" cstate="print"/>
+          <a:blip r:embed="rId2"/>
           <a:srcRect/>
           <a:stretch>
             <a:fillRect/>
@@ -4286,8 +4310,8 @@
         </p:blipFill>
         <p:spPr bwMode="auto">
           <a:xfrm>
-            <a:off x="71252" y="3851919"/>
-            <a:ext cx="4804754" cy="4406255"/>
+            <a:off x="14400" y="1792269"/>
+            <a:ext cx="4262400" cy="1350971"/>
           </a:xfrm>
           <a:prstGeom prst="rect">
             <a:avLst/>
@@ -4299,29 +4323,68 @@
             <a:headEnd/>
             <a:tailEnd/>
           </a:ln>
+          <a:effectLst/>
         </p:spPr>
       </p:pic>
       <p:sp>
         <p:nvSpPr>
-          <p:cNvPr id="5" name="Tittel 4"/>
-          <p:cNvSpPr>
-            <a:spLocks noGrp="1"/>
-          </p:cNvSpPr>
-          <p:nvPr>
-            <p:ph type="title"/>
-          </p:nvPr>
-        </p:nvSpPr>
-        <p:spPr/>
-        <p:txBody>
-          <a:bodyPr/>
-          <a:lstStyle/>
-          <a:p>
-            <a:pPr lvl="0"/>
-            <a:r>
-              <a:rPr lang="nb-NO" sz="2800" dirty="0" err="1" smtClean="0"/>
-              <a:t>Combatflite</a:t>
-            </a:r>
-            <a:endParaRPr lang="en-US" sz="2800" dirty="0"/>
+          <p:cNvPr id="4" name="TekstSylinder 3"/>
+          <p:cNvSpPr txBox="1"/>
+          <p:nvPr/>
+        </p:nvSpPr>
+        <p:spPr>
+          <a:xfrm>
+            <a:off x="316800" y="2607019"/>
+            <a:ext cx="1152000" cy="307777"/>
+          </a:xfrm>
+          <a:prstGeom prst="rect">
+            <a:avLst/>
+          </a:prstGeom>
+          <a:noFill/>
+        </p:spPr>
+        <p:txBody>
+          <a:bodyPr wrap="square" rtlCol="0">
+            <a:spAutoFit/>
+          </a:bodyPr>
+          <a:lstStyle/>
+          <a:p>
+            <a:pPr algn="ctr"/>
+            <a:r>
+              <a:rPr lang="nb-NO" dirty="0" smtClean="0"/>
+              <a:t>FRIENDLY</a:t>
+            </a:r>
+            <a:endParaRPr lang="nb-NO" dirty="0"/>
+          </a:p>
+        </p:txBody>
+      </p:sp>
+      <p:sp>
+        <p:nvSpPr>
+          <p:cNvPr id="5" name="TekstSylinder 4"/>
+          <p:cNvSpPr txBox="1"/>
+          <p:nvPr/>
+        </p:nvSpPr>
+        <p:spPr>
+          <a:xfrm>
+            <a:off x="1203600" y="2075419"/>
+            <a:ext cx="1028400" cy="307777"/>
+          </a:xfrm>
+          <a:prstGeom prst="rect">
+            <a:avLst/>
+          </a:prstGeom>
+          <a:noFill/>
+        </p:spPr>
+        <p:txBody>
+          <a:bodyPr wrap="square" rtlCol="0">
+            <a:spAutoFit/>
+          </a:bodyPr>
+          <a:lstStyle/>
+          <a:p>
+            <a:pPr algn="ctr"/>
+            <a:r>
+              <a:rPr lang="nb-NO" dirty="0" smtClean="0"/>
+              <a:t>HOSTILE</a:t>
+            </a:r>
+            <a:endParaRPr lang="nb-NO" dirty="0"/>
           </a:p>
         </p:txBody>
       </p:sp>
@@ -4333,8 +4396,8 @@
         </p:nvSpPr>
         <p:spPr>
           <a:xfrm>
-            <a:off x="483518" y="6804248"/>
-            <a:ext cx="1440160" cy="646331"/>
+            <a:off x="2155200" y="2602219"/>
+            <a:ext cx="1084800" cy="307777"/>
           </a:xfrm>
           <a:prstGeom prst="rect">
             <a:avLst/>
@@ -4349,10 +4412,10 @@
           <a:p>
             <a:pPr algn="ctr"/>
             <a:r>
-              <a:rPr lang="en-US" dirty="0" smtClean="0"/>
-              <a:t>Confirmed intelligence</a:t>
-            </a:r>
-            <a:endParaRPr lang="en-US" dirty="0"/>
+              <a:rPr lang="nb-NO" dirty="0" smtClean="0"/>
+              <a:t>NEUTRAL</a:t>
+            </a:r>
+            <a:endParaRPr lang="nb-NO" dirty="0"/>
           </a:p>
         </p:txBody>
       </p:sp>
@@ -4364,8 +4427,8 @@
         </p:nvSpPr>
         <p:spPr>
           <a:xfrm>
-            <a:off x="1635646" y="5220072"/>
-            <a:ext cx="1440160" cy="646331"/>
+            <a:off x="3000378" y="2041819"/>
+            <a:ext cx="1357322" cy="369332"/>
           </a:xfrm>
           <a:prstGeom prst="rect">
             <a:avLst/>
@@ -4380,10 +4443,41 @@
           <a:p>
             <a:pPr algn="ctr"/>
             <a:r>
-              <a:rPr lang="en-US" dirty="0" smtClean="0"/>
-              <a:t>Uncertain intelligence</a:t>
-            </a:r>
-            <a:endParaRPr lang="en-US" dirty="0"/>
+              <a:rPr lang="nb-NO" dirty="0" smtClean="0"/>
+              <a:t>UNKNOWN</a:t>
+            </a:r>
+            <a:endParaRPr lang="nb-NO" dirty="0"/>
+          </a:p>
+        </p:txBody>
+      </p:sp>
+      <p:sp>
+        <p:nvSpPr>
+          <p:cNvPr id="8" name="TekstSylinder 7"/>
+          <p:cNvSpPr txBox="1"/>
+          <p:nvPr/>
+        </p:nvSpPr>
+        <p:spPr>
+          <a:xfrm>
+            <a:off x="0" y="1745419"/>
+            <a:ext cx="4248000" cy="307777"/>
+          </a:xfrm>
+          <a:prstGeom prst="rect">
+            <a:avLst/>
+          </a:prstGeom>
+          <a:noFill/>
+        </p:spPr>
+        <p:txBody>
+          <a:bodyPr wrap="square" rtlCol="0">
+            <a:spAutoFit/>
+          </a:bodyPr>
+          <a:lstStyle/>
+          <a:p>
+            <a:pPr algn="ctr"/>
+            <a:r>
+              <a:rPr lang="nb-NO" b="1" u="sng" dirty="0" smtClean="0"/>
+              <a:t>COMBATFLITE SYMBOLS</a:t>
+            </a:r>
+            <a:endParaRPr lang="nb-NO" b="1" u="sng" dirty="0"/>
           </a:p>
         </p:txBody>
       </p:sp>
@@ -4392,13 +4486,6 @@
   <p:clrMapOvr>
     <a:masterClrMapping/>
   </p:clrMapOvr>
-  <p:timing>
-    <p:tnLst>
-      <p:par>
-        <p:cTn id="1" dur="indefinite" restart="never" nodeType="tmRoot"/>
-      </p:par>
-    </p:tnLst>
-  </p:timing>
 </p:sld>
 </file>
 
@@ -4419,73 +4506,9 @@
           <a:chExt cx="0" cy="0"/>
         </a:xfrm>
       </p:grpSpPr>
-      <p:sp>
-        <p:nvSpPr>
-          <p:cNvPr id="5" name="Tittel 4"/>
-          <p:cNvSpPr>
-            <a:spLocks noGrp="1"/>
-          </p:cNvSpPr>
-          <p:nvPr>
-            <p:ph type="title"/>
-          </p:nvPr>
-        </p:nvSpPr>
-        <p:spPr/>
-        <p:txBody>
-          <a:bodyPr/>
-          <a:lstStyle/>
-          <a:p>
-            <a:pPr lvl="0"/>
-            <a:r>
-              <a:rPr lang="nb-NO" sz="2800" dirty="0" err="1" smtClean="0"/>
-              <a:t>Combatflite</a:t>
-            </a:r>
-            <a:r>
-              <a:rPr lang="nb-NO" sz="2800" dirty="0" smtClean="0"/>
-              <a:t> symbols</a:t>
-            </a:r>
-            <a:endParaRPr lang="en-US" sz="2800" dirty="0"/>
-          </a:p>
-        </p:txBody>
-      </p:sp>
-      <p:sp>
-        <p:nvSpPr>
-          <p:cNvPr id="8" name="TekstSylinder 7"/>
-          <p:cNvSpPr txBox="1"/>
-          <p:nvPr/>
-        </p:nvSpPr>
-        <p:spPr>
-          <a:xfrm>
-            <a:off x="123478" y="2195736"/>
-            <a:ext cx="4896544" cy="1200329"/>
-          </a:xfrm>
-          <a:prstGeom prst="rect">
-            <a:avLst/>
-          </a:prstGeom>
-          <a:noFill/>
-        </p:spPr>
-        <p:txBody>
-          <a:bodyPr wrap="square" rtlCol="0">
-            <a:spAutoFit/>
-          </a:bodyPr>
-          <a:lstStyle/>
-          <a:p>
-            <a:r>
-              <a:rPr lang="en-US" b="1" dirty="0" smtClean="0"/>
-              <a:t>Uncertain intelligence</a:t>
-            </a:r>
-          </a:p>
-          <a:p>
-            <a:r>
-              <a:rPr lang="en-US" dirty="0" smtClean="0"/>
-              <a:t>For information that is uncertain, the circle will be drawn with fill opacity as shown below, and line style set as dash dot.</a:t>
-            </a:r>
-            <a:endParaRPr lang="en-US" dirty="0"/>
-          </a:p>
-        </p:txBody>
-      </p:sp>
       <p:pic>
         <p:nvPicPr>
-          <p:cNvPr id="2050" name="Picture 2"/>
+          <p:cNvPr id="2" name="Picture 2"/>
           <p:cNvPicPr>
             <a:picLocks noChangeAspect="1" noChangeArrowheads="1"/>
           </p:cNvPicPr>
@@ -4500,8 +4523,8 @@
         </p:blipFill>
         <p:spPr bwMode="auto">
           <a:xfrm>
-            <a:off x="1" y="4067944"/>
-            <a:ext cx="4571608" cy="4247380"/>
+            <a:off x="71252" y="3851919"/>
+            <a:ext cx="4804754" cy="4406255"/>
           </a:xfrm>
           <a:prstGeom prst="rect">
             <a:avLst/>
@@ -4515,6 +4538,92 @@
           </a:ln>
         </p:spPr>
       </p:pic>
+      <p:sp>
+        <p:nvSpPr>
+          <p:cNvPr id="5" name="Tittel 4"/>
+          <p:cNvSpPr>
+            <a:spLocks noGrp="1"/>
+          </p:cNvSpPr>
+          <p:nvPr>
+            <p:ph type="title"/>
+          </p:nvPr>
+        </p:nvSpPr>
+        <p:spPr/>
+        <p:txBody>
+          <a:bodyPr/>
+          <a:lstStyle/>
+          <a:p>
+            <a:pPr lvl="0"/>
+            <a:r>
+              <a:rPr lang="nb-NO" sz="2800" dirty="0" err="1" smtClean="0"/>
+              <a:t>Combatflite</a:t>
+            </a:r>
+            <a:endParaRPr lang="en-US" sz="2800" dirty="0"/>
+          </a:p>
+        </p:txBody>
+      </p:sp>
+      <p:sp>
+        <p:nvSpPr>
+          <p:cNvPr id="6" name="TekstSylinder 5"/>
+          <p:cNvSpPr txBox="1"/>
+          <p:nvPr/>
+        </p:nvSpPr>
+        <p:spPr>
+          <a:xfrm>
+            <a:off x="483518" y="6804248"/>
+            <a:ext cx="1440160" cy="646331"/>
+          </a:xfrm>
+          <a:prstGeom prst="rect">
+            <a:avLst/>
+          </a:prstGeom>
+          <a:noFill/>
+        </p:spPr>
+        <p:txBody>
+          <a:bodyPr wrap="square" rtlCol="0">
+            <a:spAutoFit/>
+          </a:bodyPr>
+          <a:lstStyle/>
+          <a:p>
+            <a:pPr algn="ctr"/>
+            <a:r>
+              <a:rPr lang="en-US" dirty="0" smtClean="0"/>
+              <a:t>Confirmed intelligence</a:t>
+            </a:r>
+            <a:endParaRPr lang="en-US" dirty="0"/>
+          </a:p>
+        </p:txBody>
+      </p:sp>
+      <p:sp>
+        <p:nvSpPr>
+          <p:cNvPr id="7" name="TekstSylinder 6"/>
+          <p:cNvSpPr txBox="1"/>
+          <p:nvPr/>
+        </p:nvSpPr>
+        <p:spPr>
+          <a:xfrm>
+            <a:off x="1635646" y="5220072"/>
+            <a:ext cx="1440160" cy="646331"/>
+          </a:xfrm>
+          <a:prstGeom prst="rect">
+            <a:avLst/>
+          </a:prstGeom>
+          <a:noFill/>
+        </p:spPr>
+        <p:txBody>
+          <a:bodyPr wrap="square" rtlCol="0">
+            <a:spAutoFit/>
+          </a:bodyPr>
+          <a:lstStyle/>
+          <a:p>
+            <a:pPr algn="ctr"/>
+            <a:r>
+              <a:rPr lang="en-US" dirty="0" smtClean="0"/>
+              <a:t>Uncertain intelligence</a:t>
+            </a:r>
+            <a:endParaRPr lang="en-US" dirty="0"/>
+          </a:p>
+        </p:txBody>
+      </p:sp>
     </p:spTree>
   </p:cSld>
   <p:clrMapOvr>
@@ -4583,7 +4692,7 @@
         </p:nvSpPr>
         <p:spPr>
           <a:xfrm>
-            <a:off x="123478" y="1835696"/>
+            <a:off x="123478" y="2195736"/>
             <a:ext cx="4896544" cy="1200329"/>
           </a:xfrm>
           <a:prstGeom prst="rect">
@@ -4599,13 +4708,13 @@
           <a:p>
             <a:r>
               <a:rPr lang="en-US" b="1" dirty="0" smtClean="0"/>
-              <a:t>Confirmed intelligence</a:t>
+              <a:t>Uncertain intelligence</a:t>
             </a:r>
           </a:p>
           <a:p>
             <a:r>
               <a:rPr lang="en-US" dirty="0" smtClean="0"/>
-              <a:t>For information that is confirmed, the circle will be drawn with fill opacity as shown below, and line style set as solid.</a:t>
+              <a:t>For information that is uncertain, the circle will be drawn with fill opacity as shown below, and line style set as dash dot.</a:t>
             </a:r>
             <a:endParaRPr lang="en-US" dirty="0"/>
           </a:p>
@@ -4613,7 +4722,7 @@
       </p:sp>
       <p:pic>
         <p:nvPicPr>
-          <p:cNvPr id="1027" name="Picture 3"/>
+          <p:cNvPr id="2050" name="Picture 2"/>
           <p:cNvPicPr>
             <a:picLocks noChangeAspect="1" noChangeArrowheads="1"/>
           </p:cNvPicPr>
@@ -4628,17 +4737,15 @@
         </p:blipFill>
         <p:spPr bwMode="auto">
           <a:xfrm>
-            <a:off x="0" y="3807952"/>
-            <a:ext cx="5143500" cy="4704347"/>
+            <a:off x="1" y="4067944"/>
+            <a:ext cx="4571608" cy="4247380"/>
           </a:xfrm>
           <a:prstGeom prst="rect">
             <a:avLst/>
           </a:prstGeom>
           <a:noFill/>
           <a:ln w="9525">
-            <a:solidFill>
-              <a:schemeClr val="tx1"/>
-            </a:solidFill>
+            <a:noFill/>
             <a:miter lim="800000"/>
             <a:headEnd/>
             <a:tailEnd/>
@@ -4699,6 +4806,136 @@
             </a:r>
             <a:r>
               <a:rPr lang="nb-NO" sz="2800" dirty="0" smtClean="0"/>
+              <a:t> symbols</a:t>
+            </a:r>
+            <a:endParaRPr lang="en-US" sz="2800" dirty="0"/>
+          </a:p>
+        </p:txBody>
+      </p:sp>
+      <p:sp>
+        <p:nvSpPr>
+          <p:cNvPr id="8" name="TekstSylinder 7"/>
+          <p:cNvSpPr txBox="1"/>
+          <p:nvPr/>
+        </p:nvSpPr>
+        <p:spPr>
+          <a:xfrm>
+            <a:off x="123478" y="1835696"/>
+            <a:ext cx="4896544" cy="1200329"/>
+          </a:xfrm>
+          <a:prstGeom prst="rect">
+            <a:avLst/>
+          </a:prstGeom>
+          <a:noFill/>
+        </p:spPr>
+        <p:txBody>
+          <a:bodyPr wrap="square" rtlCol="0">
+            <a:spAutoFit/>
+          </a:bodyPr>
+          <a:lstStyle/>
+          <a:p>
+            <a:r>
+              <a:rPr lang="en-US" b="1" dirty="0" smtClean="0"/>
+              <a:t>Confirmed intelligence</a:t>
+            </a:r>
+          </a:p>
+          <a:p>
+            <a:r>
+              <a:rPr lang="en-US" dirty="0" smtClean="0"/>
+              <a:t>For information that is confirmed, the circle will be drawn with fill opacity as shown below, and line style set as solid.</a:t>
+            </a:r>
+            <a:endParaRPr lang="en-US" dirty="0"/>
+          </a:p>
+        </p:txBody>
+      </p:sp>
+      <p:pic>
+        <p:nvPicPr>
+          <p:cNvPr id="1027" name="Picture 3"/>
+          <p:cNvPicPr>
+            <a:picLocks noChangeAspect="1" noChangeArrowheads="1"/>
+          </p:cNvPicPr>
+          <p:nvPr/>
+        </p:nvPicPr>
+        <p:blipFill>
+          <a:blip r:embed="rId2" cstate="print"/>
+          <a:srcRect/>
+          <a:stretch>
+            <a:fillRect/>
+          </a:stretch>
+        </p:blipFill>
+        <p:spPr bwMode="auto">
+          <a:xfrm>
+            <a:off x="0" y="3807952"/>
+            <a:ext cx="5143500" cy="4704347"/>
+          </a:xfrm>
+          <a:prstGeom prst="rect">
+            <a:avLst/>
+          </a:prstGeom>
+          <a:noFill/>
+          <a:ln w="9525">
+            <a:solidFill>
+              <a:schemeClr val="tx1"/>
+            </a:solidFill>
+            <a:miter lim="800000"/>
+            <a:headEnd/>
+            <a:tailEnd/>
+          </a:ln>
+        </p:spPr>
+      </p:pic>
+    </p:spTree>
+  </p:cSld>
+  <p:clrMapOvr>
+    <a:masterClrMapping/>
+  </p:clrMapOvr>
+  <p:timing>
+    <p:tnLst>
+      <p:par>
+        <p:cTn id="1" dur="indefinite" restart="never" nodeType="tmRoot"/>
+      </p:par>
+    </p:tnLst>
+  </p:timing>
+</p:sld>
+</file>
+
+<file path=ppt/slides/slide14.xml><?xml version="1.0" encoding="utf-8"?>
+<p:sld xmlns:a="http://schemas.openxmlformats.org/drawingml/2006/main" xmlns:r="http://schemas.openxmlformats.org/officeDocument/2006/relationships" xmlns:p="http://schemas.openxmlformats.org/presentationml/2006/main">
+  <p:cSld>
+    <p:spTree>
+      <p:nvGrpSpPr>
+        <p:cNvPr id="1" name=""/>
+        <p:cNvGrpSpPr/>
+        <p:nvPr/>
+      </p:nvGrpSpPr>
+      <p:grpSpPr>
+        <a:xfrm>
+          <a:off x="0" y="0"/>
+          <a:ext cx="0" cy="0"/>
+          <a:chOff x="0" y="0"/>
+          <a:chExt cx="0" cy="0"/>
+        </a:xfrm>
+      </p:grpSpPr>
+      <p:sp>
+        <p:nvSpPr>
+          <p:cNvPr id="5" name="Tittel 4"/>
+          <p:cNvSpPr>
+            <a:spLocks noGrp="1"/>
+          </p:cNvSpPr>
+          <p:nvPr>
+            <p:ph type="title"/>
+          </p:nvPr>
+        </p:nvSpPr>
+        <p:spPr/>
+        <p:txBody>
+          <a:bodyPr/>
+          <a:lstStyle/>
+          <a:p>
+            <a:pPr lvl="0"/>
+            <a:r>
+              <a:rPr lang="nb-NO" sz="2800" dirty="0" err="1" smtClean="0"/>
+              <a:t>Combatflite</a:t>
+            </a:r>
+            <a:r>
+              <a:rPr lang="nb-NO" sz="2800" dirty="0" smtClean="0"/>
               <a:t> </a:t>
             </a:r>
             <a:r>
@@ -4928,7 +5165,7 @@
 </p:sld>
 </file>
 
-<file path=ppt/slides/slide14.xml><?xml version="1.0" encoding="utf-8"?>
+<file path=ppt/slides/slide15.xml><?xml version="1.0" encoding="utf-8"?>
 <p:sld xmlns:a="http://schemas.openxmlformats.org/drawingml/2006/main" xmlns:r="http://schemas.openxmlformats.org/officeDocument/2006/relationships" xmlns:p="http://schemas.openxmlformats.org/presentationml/2006/main">
   <p:cSld>
     <p:spTree>
@@ -6276,13 +6513,30 @@
           <a:p>
             <a:r>
               <a:rPr lang="en-US" b="1" dirty="0" smtClean="0"/>
-              <a:t>Intelligence to Air Operations Centre (AOC):</a:t>
-            </a:r>
+              <a:t>Intelligence to </a:t>
+            </a:r>
+            <a:r>
+              <a:rPr lang="en-US" b="1" dirty="0" smtClean="0"/>
+              <a:t>JFACC</a:t>
+            </a:r>
+            <a:endParaRPr lang="en-US" b="1" dirty="0" smtClean="0"/>
           </a:p>
           <a:p>
             <a:r>
               <a:rPr lang="en-US" dirty="0" smtClean="0"/>
-              <a:t>Intelligence from AOC will be the background of </a:t>
+              <a:t>Intelligence </a:t>
+            </a:r>
+            <a:r>
+              <a:rPr lang="en-US" dirty="0" err="1" smtClean="0"/>
+              <a:t>fromVIS</a:t>
+            </a:r>
+            <a:r>
+              <a:rPr lang="en-US" dirty="0" smtClean="0"/>
+              <a:t> will </a:t>
+            </a:r>
+            <a:r>
+              <a:rPr lang="en-US" dirty="0" smtClean="0"/>
+              <a:t>be the background of </a:t>
             </a:r>
             <a:r>
               <a:rPr lang="en-US" dirty="0" err="1" smtClean="0"/>
@@ -6290,7 +6544,15 @@
             </a:r>
             <a:r>
               <a:rPr lang="en-US" dirty="0" smtClean="0"/>
-              <a:t> created by the AOC for 132</a:t>
+              <a:t> created by the </a:t>
+            </a:r>
+            <a:r>
+              <a:rPr lang="en-US" dirty="0" smtClean="0"/>
+              <a:t>JFACC/AOC </a:t>
+            </a:r>
+            <a:r>
+              <a:rPr lang="en-US" dirty="0" smtClean="0"/>
+              <a:t>for 132</a:t>
             </a:r>
             <a:r>
               <a:rPr lang="en-US" baseline="30000" dirty="0" smtClean="0"/>
@@ -6317,7 +6579,11 @@
             </a:r>
             <a:r>
               <a:rPr lang="en-US" sz="1400" dirty="0" smtClean="0"/>
-              <a:t>AOC can either be the mission host, or a designated </a:t>
+              <a:t>JFACC/AOC </a:t>
+            </a:r>
+            <a:r>
+              <a:rPr lang="en-US" sz="1400" dirty="0" smtClean="0"/>
+              <a:t>can either be the mission host, or a designated </a:t>
             </a:r>
             <a:r>
               <a:rPr lang="en-US" sz="1400" dirty="0" err="1" smtClean="0"/>
@@ -6433,15 +6699,7 @@
           <a:p>
             <a:r>
               <a:rPr lang="en-US" dirty="0" smtClean="0"/>
-              <a:t>Analysis: This is where the VIS staff look into the information </a:t>
-            </a:r>
-            <a:r>
-              <a:rPr lang="en-US" dirty="0" smtClean="0"/>
-              <a:t>available, </a:t>
-            </a:r>
-            <a:r>
-              <a:rPr lang="en-US" dirty="0" smtClean="0"/>
-              <a:t>other intelligence reports, and conducts its best assessment of the situation to give a understanding on what is happening.</a:t>
+              <a:t>Analysis: This is where the VIS staff look into the information available, other intelligence reports, and conducts its best assessment of the situation to give a understanding on what is happening.</a:t>
             </a:r>
           </a:p>
           <a:p>
@@ -6551,15 +6809,7 @@
           <a:p>
             <a:r>
               <a:rPr lang="en-US" dirty="0" smtClean="0"/>
-              <a:t>Virtual Intelligence Service (VIS) </a:t>
-            </a:r>
-            <a:r>
-              <a:rPr lang="en-US" dirty="0" smtClean="0"/>
-              <a:t>can produce </a:t>
-            </a:r>
-            <a:r>
-              <a:rPr lang="en-US" dirty="0" smtClean="0"/>
-              <a:t>three different of reports. </a:t>
+              <a:t>Virtual Intelligence Service (VIS) can produce three different of reports. </a:t>
             </a:r>
           </a:p>
           <a:p>
@@ -6734,15 +6984,7 @@
           <a:p>
             <a:r>
               <a:rPr lang="en-US" dirty="0" smtClean="0"/>
-              <a:t>Virtual Intelligence Service (VIS) can </a:t>
-            </a:r>
-            <a:r>
-              <a:rPr lang="en-US" dirty="0" smtClean="0"/>
-              <a:t>receive </a:t>
-            </a:r>
-            <a:r>
-              <a:rPr lang="en-US" dirty="0" smtClean="0"/>
-              <a:t>input from several sources:</a:t>
+              <a:t>Virtual Intelligence Service (VIS) can receive input from several sources:</a:t>
             </a:r>
           </a:p>
           <a:p>

</xml_diff>